<commit_message>
Added Items to PPT
</commit_message>
<xml_diff>
--- a/NW-Parallel Presentation.pptx
+++ b/NW-Parallel Presentation.pptx
@@ -23,9 +23,20 @@
   <p:notesSz cx="6858000" cy="9144000"/>
   <p:embeddedFontLst>
     <p:embeddedFont>
+      <p:font typeface="Calibri" panose="020F0502020204030204" pitchFamily="34" charset="0"/>
+      <p:regular r:id="rId13"/>
+      <p:bold r:id="rId14"/>
+      <p:italic r:id="rId15"/>
+      <p:boldItalic r:id="rId16"/>
+    </p:embeddedFont>
+    <p:embeddedFont>
       <p:font typeface="Muli" panose="020B0604020202020204" charset="0"/>
-      <p:regular r:id="rId13"/>
-      <p:italic r:id="rId14"/>
+      <p:regular r:id="rId17"/>
+      <p:italic r:id="rId18"/>
+    </p:embeddedFont>
+    <p:embeddedFont>
+      <p:font typeface="Cambria Math" panose="02040503050406030204" pitchFamily="18" charset="0"/>
+      <p:regular r:id="rId19"/>
     </p:embeddedFont>
   </p:embeddedFontLst>
   <p:defaultTextStyle>
@@ -8013,11 +8024,14 @@
               <a:t>st</a:t>
             </a:r>
             <a:r>
-              <a:rPr lang="en" sz="1800" dirty="0">
+              <a:rPr lang="en" sz="1800">
                 <a:latin typeface="+mn-lt"/>
               </a:rPr>
-              <a:t>, 2015</a:t>
+              <a:t>, 2016</a:t>
             </a:r>
+            <a:endParaRPr lang="en" sz="1800" dirty="0">
+              <a:latin typeface="+mn-lt"/>
+            </a:endParaRPr>
           </a:p>
           <a:p>
             <a:pPr>
@@ -8153,7 +8167,7 @@
         </p:nvSpPr>
         <p:spPr>
           <a:xfrm>
-            <a:off x="2880950" y="1061352"/>
+            <a:off x="2758388" y="1058784"/>
             <a:ext cx="3365399" cy="1447750"/>
           </a:xfrm>
           <a:prstGeom prst="rect">
@@ -8197,8 +8211,8 @@
         </p:nvSpPr>
         <p:spPr>
           <a:xfrm>
-            <a:off x="3015609" y="2509102"/>
-            <a:ext cx="3341000" cy="2491662"/>
+            <a:off x="2638950" y="2435742"/>
+            <a:ext cx="3927471" cy="2634397"/>
           </a:xfrm>
           <a:prstGeom prst="rect">
             <a:avLst/>
@@ -8214,7 +8228,11 @@
           </a:bodyPr>
           <a:lstStyle/>
           <a:p>
-            <a:pPr marL="171450" indent="-171450"/>
+            <a:pPr marL="171450" indent="-171450">
+              <a:lnSpc>
+                <a:spcPct val="150000"/>
+              </a:lnSpc>
+            </a:pPr>
             <a:r>
               <a:rPr lang="en-US" sz="2200" dirty="0">
                 <a:solidFill>
@@ -8222,7 +8240,7 @@
                 </a:solidFill>
                 <a:sym typeface="Muli"/>
               </a:rPr>
-              <a:t>Template</a:t>
+              <a:t>Optimizing the execution time through a concurrent program for the Needleman-Wunch algorithm</a:t>
             </a:r>
             <a:endParaRPr lang="en" sz="2200" dirty="0">
               <a:solidFill>
@@ -9225,6 +9243,42 @@
               <a:t>	2. Trace Back</a:t>
             </a:r>
           </a:p>
+          <a:p>
+            <a:pPr marL="342900" lvl="2" indent="-342900" algn="just">
+              <a:spcBef>
+                <a:spcPts val="600"/>
+              </a:spcBef>
+              <a:spcAft>
+                <a:spcPts val="600"/>
+              </a:spcAft>
+              <a:buFont typeface="Arial" panose="020B0604020202020204" pitchFamily="34" charset="0"/>
+              <a:buChar char="•"/>
+            </a:pPr>
+            <a:r>
+              <a:rPr lang="en-US" sz="1900" dirty="0">
+                <a:latin typeface="+mn-lt"/>
+              </a:rPr>
+              <a:t>Time Complexity</a:t>
+            </a:r>
+            <a:r>
+              <a:rPr lang="en-US" sz="1900">
+                <a:latin typeface="+mn-lt"/>
+              </a:rPr>
+              <a:t>: O (</a:t>
+            </a:r>
+            <a:r>
+              <a:rPr lang="en-US" sz="1900" dirty="0" err="1">
+                <a:latin typeface="+mn-lt"/>
+              </a:rPr>
+              <a:t>mn</a:t>
+            </a:r>
+            <a:r>
+              <a:rPr lang="en-US" sz="1900" dirty="0">
+                <a:latin typeface="+mn-lt"/>
+              </a:rPr>
+              <a:t>)</a:t>
+            </a:r>
+          </a:p>
         </p:txBody>
       </p:sp>
     </p:spTree>
@@ -9316,8 +9370,8 @@
         </p:nvSpPr>
         <p:spPr>
           <a:xfrm>
-            <a:off x="1473019" y="1008185"/>
-            <a:ext cx="1893467" cy="1723549"/>
+            <a:off x="1418491" y="1042077"/>
+            <a:ext cx="2028119" cy="1723549"/>
           </a:xfrm>
           <a:prstGeom prst="rect">
             <a:avLst/>
@@ -9339,7 +9393,7 @@
               </a:spcAft>
             </a:pPr>
             <a:r>
-              <a:rPr lang="en-US" sz="1900" dirty="0">
+              <a:rPr lang="en-US" sz="1900" b="1" dirty="0">
                 <a:latin typeface="+mn-lt"/>
               </a:rPr>
               <a:t>Scoring System</a:t>
@@ -9397,6 +9451,520 @@
                 <a:latin typeface="+mn-lt"/>
               </a:rPr>
               <a:t>Gap -2</a:t>
+            </a:r>
+          </a:p>
+        </p:txBody>
+      </p:sp>
+      <p:sp>
+        <p:nvSpPr>
+          <p:cNvPr id="4" name="Rectangle 3"/>
+          <p:cNvSpPr/>
+          <p:nvPr/>
+        </p:nvSpPr>
+        <p:spPr>
+          <a:xfrm>
+            <a:off x="3610707" y="967037"/>
+            <a:ext cx="4222064" cy="2822010"/>
+          </a:xfrm>
+          <a:prstGeom prst="rect">
+            <a:avLst/>
+          </a:prstGeom>
+          <a:solidFill>
+            <a:schemeClr val="bg1"/>
+          </a:solidFill>
+          <a:ln>
+            <a:noFill/>
+          </a:ln>
+        </p:spPr>
+        <p:style>
+          <a:lnRef idx="2">
+            <a:schemeClr val="accent1">
+              <a:shade val="50000"/>
+            </a:schemeClr>
+          </a:lnRef>
+          <a:fillRef idx="1">
+            <a:schemeClr val="accent1"/>
+          </a:fillRef>
+          <a:effectRef idx="0">
+            <a:schemeClr val="accent1"/>
+          </a:effectRef>
+          <a:fontRef idx="minor">
+            <a:schemeClr val="lt1"/>
+          </a:fontRef>
+        </p:style>
+        <p:txBody>
+          <a:bodyPr rtlCol="0" anchor="ctr"/>
+          <a:lstStyle/>
+          <a:p>
+            <a:pPr algn="ctr"/>
+            <a:endParaRPr lang="en-US"/>
+          </a:p>
+        </p:txBody>
+      </p:sp>
+      <p:pic>
+        <p:nvPicPr>
+          <p:cNvPr id="3" name="Picture 2"/>
+          <p:cNvPicPr>
+            <a:picLocks noChangeAspect="1"/>
+          </p:cNvPicPr>
+          <p:nvPr/>
+        </p:nvPicPr>
+        <p:blipFill>
+          <a:blip r:embed="rId4"/>
+          <a:stretch>
+            <a:fillRect/>
+          </a:stretch>
+        </p:blipFill>
+        <p:spPr>
+          <a:xfrm>
+            <a:off x="3610707" y="947530"/>
+            <a:ext cx="4203403" cy="2841517"/>
+          </a:xfrm>
+          <a:prstGeom prst="rect">
+            <a:avLst/>
+          </a:prstGeom>
+        </p:spPr>
+      </p:pic>
+      <mc:AlternateContent xmlns:mc="http://schemas.openxmlformats.org/markup-compatibility/2006">
+        <mc:Choice xmlns:a14="http://schemas.microsoft.com/office/drawing/2010/main" Requires="a14">
+          <p:sp>
+            <p:nvSpPr>
+              <p:cNvPr id="6" name="Rectangle 5"/>
+              <p:cNvSpPr/>
+              <p:nvPr/>
+            </p:nvSpPr>
+            <p:spPr>
+              <a:xfrm>
+                <a:off x="1336289" y="3804967"/>
+                <a:ext cx="2918684" cy="780150"/>
+              </a:xfrm>
+              <a:prstGeom prst="rect">
+                <a:avLst/>
+              </a:prstGeom>
+            </p:spPr>
+            <p:txBody>
+              <a:bodyPr wrap="none">
+                <a:spAutoFit/>
+              </a:bodyPr>
+              <a:lstStyle/>
+              <a:p>
+                <a:r>
+                  <a:rPr lang="en-US" dirty="0">
+                    <a:latin typeface="Calibri" panose="020F0502020204030204" pitchFamily="34" charset="0"/>
+                    <a:ea typeface="Calibri" panose="020F0502020204030204" pitchFamily="34" charset="0"/>
+                    <a:cs typeface="Times New Roman" panose="02020603050405020304" pitchFamily="18" charset="0"/>
+                  </a:rPr>
+                  <a:t>S(</a:t>
+                </a:r>
+                <a:r>
+                  <a:rPr lang="en-US" dirty="0" err="1">
+                    <a:latin typeface="Calibri" panose="020F0502020204030204" pitchFamily="34" charset="0"/>
+                    <a:ea typeface="Calibri" panose="020F0502020204030204" pitchFamily="34" charset="0"/>
+                    <a:cs typeface="Times New Roman" panose="02020603050405020304" pitchFamily="18" charset="0"/>
+                  </a:rPr>
+                  <a:t>i</a:t>
+                </a:r>
+                <a:r>
+                  <a:rPr lang="en-US" dirty="0">
+                    <a:latin typeface="Calibri" panose="020F0502020204030204" pitchFamily="34" charset="0"/>
+                    <a:ea typeface="Calibri" panose="020F0502020204030204" pitchFamily="34" charset="0"/>
+                    <a:cs typeface="Times New Roman" panose="02020603050405020304" pitchFamily="18" charset="0"/>
+                  </a:rPr>
+                  <a:t>, j) = max </a:t>
+                </a:r>
+                <a14:m>
+                  <m:oMath xmlns:m="http://schemas.openxmlformats.org/officeDocument/2006/math">
+                    <m:d>
+                      <m:dPr>
+                        <m:begChr m:val="{"/>
+                        <m:endChr m:val="}"/>
+                        <m:ctrlPr>
+                          <a:rPr lang="en-US" i="1">
+                            <a:effectLst/>
+                            <a:latin typeface="Cambria Math" panose="02040503050406030204" pitchFamily="18" charset="0"/>
+                          </a:rPr>
+                        </m:ctrlPr>
+                      </m:dPr>
+                      <m:e>
+                        <m:eqArr>
+                          <m:eqArrPr>
+                            <m:ctrlPr>
+                              <a:rPr lang="en-US" i="1">
+                                <a:effectLst/>
+                                <a:latin typeface="Cambria Math" panose="02040503050406030204" pitchFamily="18" charset="0"/>
+                              </a:rPr>
+                            </m:ctrlPr>
+                          </m:eqArrPr>
+                          <m:e>
+                            <m:r>
+                              <a:rPr lang="en-US" i="1">
+                                <a:latin typeface="Cambria Math" panose="02040503050406030204" pitchFamily="18" charset="0"/>
+                                <a:ea typeface="Calibri" panose="020F0502020204030204" pitchFamily="34" charset="0"/>
+                                <a:cs typeface="Times New Roman" panose="02020603050405020304" pitchFamily="18" charset="0"/>
+                              </a:rPr>
+                              <m:t>𝑆</m:t>
+                            </m:r>
+                            <m:r>
+                              <a:rPr lang="en-US" i="1">
+                                <a:latin typeface="Cambria Math" panose="02040503050406030204" pitchFamily="18" charset="0"/>
+                                <a:ea typeface="Calibri" panose="020F0502020204030204" pitchFamily="34" charset="0"/>
+                                <a:cs typeface="Times New Roman" panose="02020603050405020304" pitchFamily="18" charset="0"/>
+                              </a:rPr>
+                              <m:t>(</m:t>
+                            </m:r>
+                            <m:r>
+                              <a:rPr lang="en-US" i="1">
+                                <a:latin typeface="Cambria Math" panose="02040503050406030204" pitchFamily="18" charset="0"/>
+                                <a:ea typeface="Calibri" panose="020F0502020204030204" pitchFamily="34" charset="0"/>
+                                <a:cs typeface="Times New Roman" panose="02020603050405020304" pitchFamily="18" charset="0"/>
+                              </a:rPr>
+                              <m:t>𝑖</m:t>
+                            </m:r>
+                            <m:r>
+                              <a:rPr lang="en-US" i="1">
+                                <a:latin typeface="Cambria Math" panose="02040503050406030204" pitchFamily="18" charset="0"/>
+                                <a:ea typeface="Calibri" panose="020F0502020204030204" pitchFamily="34" charset="0"/>
+                                <a:cs typeface="Times New Roman" panose="02020603050405020304" pitchFamily="18" charset="0"/>
+                              </a:rPr>
+                              <m:t>−1, </m:t>
+                            </m:r>
+                            <m:r>
+                              <a:rPr lang="en-US" i="1">
+                                <a:latin typeface="Cambria Math" panose="02040503050406030204" pitchFamily="18" charset="0"/>
+                                <a:ea typeface="Calibri" panose="020F0502020204030204" pitchFamily="34" charset="0"/>
+                                <a:cs typeface="Times New Roman" panose="02020603050405020304" pitchFamily="18" charset="0"/>
+                              </a:rPr>
+                              <m:t>𝑗</m:t>
+                            </m:r>
+                            <m:r>
+                              <a:rPr lang="en-US" i="1">
+                                <a:latin typeface="Cambria Math" panose="02040503050406030204" pitchFamily="18" charset="0"/>
+                                <a:ea typeface="Calibri" panose="020F0502020204030204" pitchFamily="34" charset="0"/>
+                                <a:cs typeface="Times New Roman" panose="02020603050405020304" pitchFamily="18" charset="0"/>
+                              </a:rPr>
+                              <m:t>−1+</m:t>
+                            </m:r>
+                            <m:r>
+                              <a:rPr lang="en-US" i="1">
+                                <a:latin typeface="Cambria Math" panose="02040503050406030204" pitchFamily="18" charset="0"/>
+                                <a:ea typeface="Calibri" panose="020F0502020204030204" pitchFamily="34" charset="0"/>
+                                <a:cs typeface="Times New Roman" panose="02020603050405020304" pitchFamily="18" charset="0"/>
+                              </a:rPr>
+                              <m:t>𝑐</m:t>
+                            </m:r>
+                            <m:r>
+                              <a:rPr lang="en-US" i="1">
+                                <a:latin typeface="Cambria Math" panose="02040503050406030204" pitchFamily="18" charset="0"/>
+                                <a:ea typeface="Calibri" panose="020F0502020204030204" pitchFamily="34" charset="0"/>
+                                <a:cs typeface="Times New Roman" panose="02020603050405020304" pitchFamily="18" charset="0"/>
+                              </a:rPr>
+                              <m:t>(</m:t>
+                            </m:r>
+                            <m:r>
+                              <a:rPr lang="en-US" i="1">
+                                <a:latin typeface="Cambria Math" panose="02040503050406030204" pitchFamily="18" charset="0"/>
+                                <a:ea typeface="Calibri" panose="020F0502020204030204" pitchFamily="34" charset="0"/>
+                                <a:cs typeface="Times New Roman" panose="02020603050405020304" pitchFamily="18" charset="0"/>
+                              </a:rPr>
+                              <m:t>𝑖</m:t>
+                            </m:r>
+                            <m:r>
+                              <a:rPr lang="en-US" i="1">
+                                <a:latin typeface="Cambria Math" panose="02040503050406030204" pitchFamily="18" charset="0"/>
+                                <a:ea typeface="Calibri" panose="020F0502020204030204" pitchFamily="34" charset="0"/>
+                                <a:cs typeface="Times New Roman" panose="02020603050405020304" pitchFamily="18" charset="0"/>
+                              </a:rPr>
+                              <m:t>, </m:t>
+                            </m:r>
+                            <m:r>
+                              <a:rPr lang="en-US" i="1">
+                                <a:latin typeface="Cambria Math" panose="02040503050406030204" pitchFamily="18" charset="0"/>
+                                <a:ea typeface="Calibri" panose="020F0502020204030204" pitchFamily="34" charset="0"/>
+                                <a:cs typeface="Times New Roman" panose="02020603050405020304" pitchFamily="18" charset="0"/>
+                              </a:rPr>
+                              <m:t>𝑗</m:t>
+                            </m:r>
+                            <m:r>
+                              <a:rPr lang="en-US" i="1">
+                                <a:latin typeface="Cambria Math" panose="02040503050406030204" pitchFamily="18" charset="0"/>
+                                <a:ea typeface="Calibri" panose="020F0502020204030204" pitchFamily="34" charset="0"/>
+                                <a:cs typeface="Times New Roman" panose="02020603050405020304" pitchFamily="18" charset="0"/>
+                              </a:rPr>
+                              <m:t>)</m:t>
+                            </m:r>
+                          </m:e>
+                          <m:e>
+                            <m:r>
+                              <a:rPr lang="en-US" i="1">
+                                <a:latin typeface="Cambria Math" panose="02040503050406030204" pitchFamily="18" charset="0"/>
+                                <a:ea typeface="Calibri" panose="020F0502020204030204" pitchFamily="34" charset="0"/>
+                                <a:cs typeface="Times New Roman" panose="02020603050405020304" pitchFamily="18" charset="0"/>
+                              </a:rPr>
+                              <m:t>𝑆</m:t>
+                            </m:r>
+                            <m:d>
+                              <m:dPr>
+                                <m:ctrlPr>
+                                  <a:rPr lang="en-US" i="1">
+                                    <a:effectLst/>
+                                    <a:latin typeface="Cambria Math" panose="02040503050406030204" pitchFamily="18" charset="0"/>
+                                  </a:rPr>
+                                </m:ctrlPr>
+                              </m:dPr>
+                              <m:e>
+                                <m:r>
+                                  <a:rPr lang="en-US" i="1">
+                                    <a:latin typeface="Cambria Math" panose="02040503050406030204" pitchFamily="18" charset="0"/>
+                                    <a:ea typeface="Calibri" panose="020F0502020204030204" pitchFamily="34" charset="0"/>
+                                    <a:cs typeface="Times New Roman" panose="02020603050405020304" pitchFamily="18" charset="0"/>
+                                  </a:rPr>
+                                  <m:t>𝑖</m:t>
+                                </m:r>
+                                <m:r>
+                                  <a:rPr lang="en-US" i="1">
+                                    <a:latin typeface="Cambria Math" panose="02040503050406030204" pitchFamily="18" charset="0"/>
+                                    <a:ea typeface="Calibri" panose="020F0502020204030204" pitchFamily="34" charset="0"/>
+                                    <a:cs typeface="Times New Roman" panose="02020603050405020304" pitchFamily="18" charset="0"/>
+                                  </a:rPr>
+                                  <m:t>−1, </m:t>
+                                </m:r>
+                                <m:r>
+                                  <a:rPr lang="en-US" i="1">
+                                    <a:latin typeface="Cambria Math" panose="02040503050406030204" pitchFamily="18" charset="0"/>
+                                    <a:ea typeface="Calibri" panose="020F0502020204030204" pitchFamily="34" charset="0"/>
+                                    <a:cs typeface="Times New Roman" panose="02020603050405020304" pitchFamily="18" charset="0"/>
+                                  </a:rPr>
+                                  <m:t>𝑗</m:t>
+                                </m:r>
+                              </m:e>
+                            </m:d>
+                            <m:r>
+                              <a:rPr lang="en-US" i="1">
+                                <a:latin typeface="Cambria Math" panose="02040503050406030204" pitchFamily="18" charset="0"/>
+                                <a:ea typeface="Calibri" panose="020F0502020204030204" pitchFamily="34" charset="0"/>
+                                <a:cs typeface="Times New Roman" panose="02020603050405020304" pitchFamily="18" charset="0"/>
+                              </a:rPr>
+                              <m:t>+</m:t>
+                            </m:r>
+                            <m:r>
+                              <a:rPr lang="en-US" i="1">
+                                <a:latin typeface="Cambria Math" panose="02040503050406030204" pitchFamily="18" charset="0"/>
+                                <a:ea typeface="Calibri" panose="020F0502020204030204" pitchFamily="34" charset="0"/>
+                                <a:cs typeface="Times New Roman" panose="02020603050405020304" pitchFamily="18" charset="0"/>
+                              </a:rPr>
+                              <m:t>𝑐</m:t>
+                            </m:r>
+                            <m:d>
+                              <m:dPr>
+                                <m:ctrlPr>
+                                  <a:rPr lang="en-US" i="1">
+                                    <a:effectLst/>
+                                    <a:latin typeface="Cambria Math" panose="02040503050406030204" pitchFamily="18" charset="0"/>
+                                  </a:rPr>
+                                </m:ctrlPr>
+                              </m:dPr>
+                              <m:e>
+                                <m:r>
+                                  <a:rPr lang="en-US" i="1">
+                                    <a:latin typeface="Cambria Math" panose="02040503050406030204" pitchFamily="18" charset="0"/>
+                                    <a:ea typeface="Calibri" panose="020F0502020204030204" pitchFamily="34" charset="0"/>
+                                    <a:cs typeface="Times New Roman" panose="02020603050405020304" pitchFamily="18" charset="0"/>
+                                  </a:rPr>
+                                  <m:t>𝑖</m:t>
+                                </m:r>
+                                <m:r>
+                                  <a:rPr lang="en-US" i="1">
+                                    <a:latin typeface="Cambria Math" panose="02040503050406030204" pitchFamily="18" charset="0"/>
+                                    <a:ea typeface="Calibri" panose="020F0502020204030204" pitchFamily="34" charset="0"/>
+                                    <a:cs typeface="Times New Roman" panose="02020603050405020304" pitchFamily="18" charset="0"/>
+                                  </a:rPr>
+                                  <m:t>,−</m:t>
+                                </m:r>
+                              </m:e>
+                            </m:d>
+                          </m:e>
+                          <m:e>
+                            <m:r>
+                              <a:rPr lang="en-US" i="1">
+                                <a:latin typeface="Cambria Math" panose="02040503050406030204" pitchFamily="18" charset="0"/>
+                                <a:ea typeface="Cambria Math" panose="02040503050406030204" pitchFamily="18" charset="0"/>
+                                <a:cs typeface="Cambria Math" panose="02040503050406030204" pitchFamily="18" charset="0"/>
+                              </a:rPr>
+                              <m:t>𝑆</m:t>
+                            </m:r>
+                            <m:d>
+                              <m:dPr>
+                                <m:ctrlPr>
+                                  <a:rPr lang="en-US" i="1">
+                                    <a:effectLst/>
+                                    <a:latin typeface="Cambria Math" panose="02040503050406030204" pitchFamily="18" charset="0"/>
+                                    <a:ea typeface="Cambria Math" panose="02040503050406030204" pitchFamily="18" charset="0"/>
+                                    <a:cs typeface="Cambria Math" panose="02040503050406030204" pitchFamily="18" charset="0"/>
+                                  </a:rPr>
+                                </m:ctrlPr>
+                              </m:dPr>
+                              <m:e>
+                                <m:r>
+                                  <a:rPr lang="en-US" i="1">
+                                    <a:latin typeface="Cambria Math" panose="02040503050406030204" pitchFamily="18" charset="0"/>
+                                    <a:ea typeface="Cambria Math" panose="02040503050406030204" pitchFamily="18" charset="0"/>
+                                    <a:cs typeface="Cambria Math" panose="02040503050406030204" pitchFamily="18" charset="0"/>
+                                  </a:rPr>
+                                  <m:t>𝑖</m:t>
+                                </m:r>
+                                <m:r>
+                                  <a:rPr lang="en-US" i="1">
+                                    <a:latin typeface="Cambria Math" panose="02040503050406030204" pitchFamily="18" charset="0"/>
+                                    <a:ea typeface="Cambria Math" panose="02040503050406030204" pitchFamily="18" charset="0"/>
+                                    <a:cs typeface="Cambria Math" panose="02040503050406030204" pitchFamily="18" charset="0"/>
+                                  </a:rPr>
+                                  <m:t>,</m:t>
+                                </m:r>
+                                <m:r>
+                                  <a:rPr lang="en-US" i="1">
+                                    <a:latin typeface="Cambria Math" panose="02040503050406030204" pitchFamily="18" charset="0"/>
+                                    <a:ea typeface="Cambria Math" panose="02040503050406030204" pitchFamily="18" charset="0"/>
+                                    <a:cs typeface="Cambria Math" panose="02040503050406030204" pitchFamily="18" charset="0"/>
+                                  </a:rPr>
+                                  <m:t>𝑗</m:t>
+                                </m:r>
+                                <m:r>
+                                  <a:rPr lang="en-US" i="1">
+                                    <a:latin typeface="Cambria Math" panose="02040503050406030204" pitchFamily="18" charset="0"/>
+                                    <a:ea typeface="Cambria Math" panose="02040503050406030204" pitchFamily="18" charset="0"/>
+                                    <a:cs typeface="Cambria Math" panose="02040503050406030204" pitchFamily="18" charset="0"/>
+                                  </a:rPr>
+                                  <m:t>−1</m:t>
+                                </m:r>
+                              </m:e>
+                            </m:d>
+                            <m:r>
+                              <a:rPr lang="en-US" i="1">
+                                <a:latin typeface="Cambria Math" panose="02040503050406030204" pitchFamily="18" charset="0"/>
+                                <a:ea typeface="Cambria Math" panose="02040503050406030204" pitchFamily="18" charset="0"/>
+                                <a:cs typeface="Cambria Math" panose="02040503050406030204" pitchFamily="18" charset="0"/>
+                              </a:rPr>
+                              <m:t>+</m:t>
+                            </m:r>
+                            <m:r>
+                              <a:rPr lang="en-US" i="1">
+                                <a:latin typeface="Cambria Math" panose="02040503050406030204" pitchFamily="18" charset="0"/>
+                                <a:ea typeface="Cambria Math" panose="02040503050406030204" pitchFamily="18" charset="0"/>
+                                <a:cs typeface="Cambria Math" panose="02040503050406030204" pitchFamily="18" charset="0"/>
+                              </a:rPr>
+                              <m:t>𝑐</m:t>
+                            </m:r>
+                            <m:r>
+                              <a:rPr lang="en-US" i="1">
+                                <a:latin typeface="Cambria Math" panose="02040503050406030204" pitchFamily="18" charset="0"/>
+                                <a:ea typeface="Cambria Math" panose="02040503050406030204" pitchFamily="18" charset="0"/>
+                                <a:cs typeface="Cambria Math" panose="02040503050406030204" pitchFamily="18" charset="0"/>
+                              </a:rPr>
+                              <m:t>(−, </m:t>
+                            </m:r>
+                            <m:r>
+                              <a:rPr lang="en-US" i="1">
+                                <a:latin typeface="Cambria Math" panose="02040503050406030204" pitchFamily="18" charset="0"/>
+                                <a:ea typeface="Cambria Math" panose="02040503050406030204" pitchFamily="18" charset="0"/>
+                                <a:cs typeface="Cambria Math" panose="02040503050406030204" pitchFamily="18" charset="0"/>
+                              </a:rPr>
+                              <m:t>𝑗</m:t>
+                            </m:r>
+                            <m:r>
+                              <a:rPr lang="en-US" i="1">
+                                <a:latin typeface="Cambria Math" panose="02040503050406030204" pitchFamily="18" charset="0"/>
+                                <a:ea typeface="Cambria Math" panose="02040503050406030204" pitchFamily="18" charset="0"/>
+                                <a:cs typeface="Cambria Math" panose="02040503050406030204" pitchFamily="18" charset="0"/>
+                              </a:rPr>
+                              <m:t>)</m:t>
+                            </m:r>
+                          </m:e>
+                        </m:eqArr>
+                      </m:e>
+                    </m:d>
+                  </m:oMath>
+                </a14:m>
+                <a:endParaRPr lang="en-US" dirty="0"/>
+              </a:p>
+            </p:txBody>
+          </p:sp>
+        </mc:Choice>
+        <mc:Fallback>
+          <p:sp>
+            <p:nvSpPr>
+              <p:cNvPr id="6" name="Rectangle 5"/>
+              <p:cNvSpPr>
+                <a:spLocks noRot="1" noChangeAspect="1" noMove="1" noResize="1" noEditPoints="1" noAdjustHandles="1" noChangeArrowheads="1" noChangeShapeType="1" noTextEdit="1"/>
+              </p:cNvSpPr>
+              <p:nvPr/>
+            </p:nvSpPr>
+            <p:spPr>
+              <a:xfrm>
+                <a:off x="1336289" y="3804967"/>
+                <a:ext cx="2918684" cy="780150"/>
+              </a:xfrm>
+              <a:prstGeom prst="rect">
+                <a:avLst/>
+              </a:prstGeom>
+              <a:blipFill>
+                <a:blip r:embed="rId5"/>
+                <a:stretch>
+                  <a:fillRect l="-626"/>
+                </a:stretch>
+              </a:blipFill>
+            </p:spPr>
+            <p:txBody>
+              <a:bodyPr/>
+              <a:lstStyle/>
+              <a:p>
+                <a:r>
+                  <a:rPr lang="en-US">
+                    <a:noFill/>
+                  </a:rPr>
+                  <a:t> </a:t>
+                </a:r>
+              </a:p>
+            </p:txBody>
+          </p:sp>
+        </mc:Fallback>
+      </mc:AlternateContent>
+      <p:sp>
+        <p:nvSpPr>
+          <p:cNvPr id="7" name="TextBox 6"/>
+          <p:cNvSpPr txBox="1"/>
+          <p:nvPr/>
+        </p:nvSpPr>
+        <p:spPr>
+          <a:xfrm>
+            <a:off x="1418491" y="2813280"/>
+            <a:ext cx="2192216" cy="969496"/>
+          </a:xfrm>
+          <a:prstGeom prst="rect">
+            <a:avLst/>
+          </a:prstGeom>
+          <a:noFill/>
+        </p:spPr>
+        <p:txBody>
+          <a:bodyPr wrap="square" rtlCol="0">
+            <a:spAutoFit/>
+          </a:bodyPr>
+          <a:lstStyle/>
+          <a:p>
+            <a:pPr algn="ctr"/>
+            <a:r>
+              <a:rPr lang="en-US" sz="1900" b="1" dirty="0">
+                <a:latin typeface="+mn-lt"/>
+              </a:rPr>
+              <a:t>Dynamic Programming </a:t>
+            </a:r>
+          </a:p>
+          <a:p>
+            <a:pPr algn="ctr"/>
+            <a:r>
+              <a:rPr lang="en-US" sz="1900" b="1" dirty="0">
+                <a:latin typeface="+mn-lt"/>
+              </a:rPr>
+              <a:t>Recursion</a:t>
             </a:r>
           </a:p>
         </p:txBody>

</xml_diff>